<commit_message>
Completion of Dev Workflow
</commit_message>
<xml_diff>
--- a/W1D2-The Dev Workflow/Flex Program-Curriculum Outline.pptx
+++ b/W1D2-The Dev Workflow/Flex Program-Curriculum Outline.pptx
@@ -299,6 +299,9 @@
     </a:lvl9pPr>
   </p:defaultTextStyle>
   <p:extLst>
+    <p:ext uri="{EFAFB233-063F-42B5-8137-9DF3F51BA10A}">
+      <p15:sldGuideLst xmlns:p15="http://schemas.microsoft.com/office/powerpoint/2012/main"/>
+    </p:ext>
     <p:ext uri="http://customooxmlschemas.google.com/">
       <go:slidesCustomData xmlns:go="http://customooxmlschemas.google.com/" xmlns:ahyp="http://schemas.microsoft.com/office/drawing/2018/hyperlinkcolor" xmlns:p15="http://schemas.microsoft.com/office/powerpoint/2012/main" xmlns:p14="http://schemas.microsoft.com/office/powerpoint/2010/main" xmlns:com="http://schemas.openxmlformats.org/drawingml/2006/compatibility" xmlns:pvml="urn:schemas-microsoft-com:office:powerpoint" xmlns:v="urn:schemas-microsoft-com:vml" xmlns:o="urn:schemas-microsoft-com:office:office" xmlns:dgm="http://schemas.openxmlformats.org/drawingml/2006/diagram" xmlns:c="http://schemas.openxmlformats.org/drawingml/2006/chart" xmlns:mv="urn:schemas-microsoft-com:mac:vml" xmlns:mc="http://schemas.openxmlformats.org/markup-compatibility/2006" xmlns="" r:id="rId49" roundtripDataSignature="AMtx7mgiOAfu7zGep0Y9Fief1fhenPtx/Q=="/>
     </p:ext>
@@ -911,8 +914,8 @@
         </p:nvSpPr>
         <p:spPr>
           <a:xfrm>
-            <a:off x="381188" y="685800"/>
-            <a:ext cx="6096300" cy="3429000"/>
+            <a:off x="381000" y="685800"/>
+            <a:ext cx="6096000" cy="3429000"/>
           </a:xfrm>
           <a:custGeom>
             <a:avLst/>
@@ -21405,7 +21408,7 @@
               <a:buNone/>
             </a:pPr>
             <a:r>
-              <a:rPr lang="en" sz="4800" b="1" i="0" u="none" strike="noStrike" cap="none">
+              <a:rPr lang="en" sz="4800" b="1" i="0" u="none" strike="noStrike" cap="none" dirty="0">
                 <a:solidFill>
                   <a:srgbClr val="DA5251"/>
                 </a:solidFill>
@@ -21416,7 +21419,7 @@
               </a:rPr>
               <a:t>Welcome to…</a:t>
             </a:r>
-            <a:endParaRPr sz="4800" b="1" i="0" u="none" strike="noStrike" cap="none">
+            <a:endParaRPr sz="4800" b="1" i="0" u="none" strike="noStrike" cap="none" dirty="0">
               <a:solidFill>
                 <a:srgbClr val="DA5251"/>
               </a:solidFill>
@@ -21602,7 +21605,7 @@
               <a:buNone/>
             </a:pPr>
             <a:r>
-              <a:rPr lang="en" sz="1800" b="0" i="0" u="none" strike="noStrike" cap="none">
+              <a:rPr lang="en" sz="1800" b="0" i="0" u="none" strike="noStrike" cap="none" dirty="0">
                 <a:solidFill>
                   <a:schemeClr val="lt1"/>
                 </a:solidFill>
@@ -21613,7 +21616,7 @@
               </a:rPr>
               <a:t>Front-end -- Client-side JS. Browsers. jQuery, HTML, CSS, Box Model. AJAX</a:t>
             </a:r>
-            <a:endParaRPr sz="1800" b="0" i="0" u="none" strike="noStrike" cap="none">
+            <a:endParaRPr sz="1800" b="0" i="0" u="none" strike="noStrike" cap="none" dirty="0">
               <a:solidFill>
                 <a:schemeClr val="lt1"/>
               </a:solidFill>
@@ -21641,7 +21644,7 @@
               <a:buFont typeface="Arial"/>
               <a:buNone/>
             </a:pPr>
-            <a:endParaRPr sz="1400" b="0" i="0" u="none" strike="noStrike" cap="none">
+            <a:endParaRPr sz="1400" b="0" i="0" u="none" strike="noStrike" cap="none" dirty="0">
               <a:solidFill>
                 <a:srgbClr val="000000"/>
               </a:solidFill>
@@ -23156,7 +23159,7 @@
               <a:buNone/>
             </a:pPr>
             <a:r>
-              <a:rPr lang="en" sz="1800" b="1">
+              <a:rPr lang="en" sz="1800" b="1" dirty="0">
                 <a:solidFill>
                   <a:srgbClr val="FF6867"/>
                 </a:solidFill>
@@ -23168,7 +23171,7 @@
               <a:t>1:</a:t>
             </a:r>
             <a:r>
-              <a:rPr lang="en" sz="1800">
+              <a:rPr lang="en" sz="1800" dirty="0">
                 <a:solidFill>
                   <a:srgbClr val="012D3D"/>
                 </a:solidFill>
@@ -23180,14 +23183,30 @@
               <a:t> </a:t>
             </a:r>
             <a:r>
-              <a:rPr lang="en" sz="1800">
+              <a:rPr lang="en" sz="1800" dirty="0">
                 <a:solidFill>
                   <a:schemeClr val="lt1"/>
                 </a:solidFill>
               </a:rPr>
-              <a:t>Due Week 4 - Lotide due</a:t>
-            </a:r>
-            <a:endParaRPr sz="1800">
+              <a:t>Due Week 4 - </a:t>
+            </a:r>
+            <a:r>
+              <a:rPr lang="en" sz="1800" dirty="0" err="1">
+                <a:solidFill>
+                  <a:schemeClr val="lt1"/>
+                </a:solidFill>
+              </a:rPr>
+              <a:t>Lotide</a:t>
+            </a:r>
+            <a:r>
+              <a:rPr lang="en" sz="1800" dirty="0">
+                <a:solidFill>
+                  <a:schemeClr val="lt1"/>
+                </a:solidFill>
+              </a:rPr>
+              <a:t> due</a:t>
+            </a:r>
+            <a:endParaRPr sz="1800" dirty="0">
               <a:solidFill>
                 <a:schemeClr val="lt1"/>
               </a:solidFill>
@@ -23208,7 +23227,7 @@
               <a:buNone/>
             </a:pPr>
             <a:r>
-              <a:rPr lang="en" sz="1800" b="1">
+              <a:rPr lang="en" sz="1800" b="1" dirty="0">
                 <a:solidFill>
                   <a:srgbClr val="FF6867"/>
                 </a:solidFill>
@@ -23220,7 +23239,7 @@
               <a:t>2:</a:t>
             </a:r>
             <a:r>
-              <a:rPr lang="en" sz="1800">
+              <a:rPr lang="en" sz="1800" dirty="0">
                 <a:solidFill>
                   <a:srgbClr val="012D3D"/>
                 </a:solidFill>
@@ -23232,14 +23251,30 @@
               <a:t> </a:t>
             </a:r>
             <a:r>
-              <a:rPr lang="en" sz="1800">
+              <a:rPr lang="en" sz="1800" dirty="0">
                 <a:solidFill>
                   <a:schemeClr val="lt1"/>
                 </a:solidFill>
               </a:rPr>
-              <a:t>Due Week 5 - Snek due</a:t>
-            </a:r>
-            <a:endParaRPr sz="1800">
+              <a:t>Due Week 5 - </a:t>
+            </a:r>
+            <a:r>
+              <a:rPr lang="en" sz="1800" dirty="0" err="1">
+                <a:solidFill>
+                  <a:schemeClr val="lt1"/>
+                </a:solidFill>
+              </a:rPr>
+              <a:t>Snek</a:t>
+            </a:r>
+            <a:r>
+              <a:rPr lang="en" sz="1800" dirty="0">
+                <a:solidFill>
+                  <a:schemeClr val="lt1"/>
+                </a:solidFill>
+              </a:rPr>
+              <a:t> due</a:t>
+            </a:r>
+            <a:endParaRPr sz="1800" dirty="0">
               <a:solidFill>
                 <a:schemeClr val="lt1"/>
               </a:solidFill>
@@ -23260,7 +23295,7 @@
               <a:buNone/>
             </a:pPr>
             <a:r>
-              <a:rPr lang="en" sz="1800" b="1">
+              <a:rPr lang="en" sz="1800" b="1" dirty="0">
                 <a:solidFill>
                   <a:srgbClr val="FF6867"/>
                 </a:solidFill>
@@ -23272,7 +23307,7 @@
               <a:t>3:</a:t>
             </a:r>
             <a:r>
-              <a:rPr lang="en" sz="1800">
+              <a:rPr lang="en" sz="1800" dirty="0">
                 <a:solidFill>
                   <a:srgbClr val="012D3D"/>
                 </a:solidFill>
@@ -23284,14 +23319,30 @@
               <a:t> </a:t>
             </a:r>
             <a:r>
-              <a:rPr lang="en" sz="1800">
+              <a:rPr lang="en" sz="1800" dirty="0">
                 <a:solidFill>
                   <a:schemeClr val="lt1"/>
                 </a:solidFill>
               </a:rPr>
-              <a:t>Due Week 7 - TinyApp due</a:t>
-            </a:r>
-            <a:endParaRPr sz="1800">
+              <a:t>Due Week 7 - </a:t>
+            </a:r>
+            <a:r>
+              <a:rPr lang="en" sz="1800" dirty="0" err="1">
+                <a:solidFill>
+                  <a:schemeClr val="lt1"/>
+                </a:solidFill>
+              </a:rPr>
+              <a:t>TinyApp</a:t>
+            </a:r>
+            <a:r>
+              <a:rPr lang="en" sz="1800" dirty="0">
+                <a:solidFill>
+                  <a:schemeClr val="lt1"/>
+                </a:solidFill>
+              </a:rPr>
+              <a:t> due</a:t>
+            </a:r>
+            <a:endParaRPr sz="1800" dirty="0">
               <a:solidFill>
                 <a:schemeClr val="lt1"/>
               </a:solidFill>
@@ -23312,7 +23363,7 @@
               <a:buNone/>
             </a:pPr>
             <a:r>
-              <a:rPr lang="en" sz="1800" b="1">
+              <a:rPr lang="en" sz="1800" b="1" dirty="0">
                 <a:solidFill>
                   <a:srgbClr val="FF6867"/>
                 </a:solidFill>
@@ -23324,7 +23375,7 @@
               <a:t>4:</a:t>
             </a:r>
             <a:r>
-              <a:rPr lang="en" sz="1800">
+              <a:rPr lang="en" sz="1800" dirty="0">
                 <a:solidFill>
                   <a:srgbClr val="012D3D"/>
                 </a:solidFill>
@@ -23336,14 +23387,14 @@
               <a:t> </a:t>
             </a:r>
             <a:r>
-              <a:rPr lang="en" sz="1800">
+              <a:rPr lang="en" sz="1800" dirty="0">
                 <a:solidFill>
                   <a:schemeClr val="lt1"/>
                 </a:solidFill>
               </a:rPr>
               <a:t>Due Week 10 - Tweeter due</a:t>
             </a:r>
-            <a:endParaRPr sz="1800">
+            <a:endParaRPr sz="1800" dirty="0">
               <a:solidFill>
                 <a:schemeClr val="lt1"/>
               </a:solidFill>
@@ -23364,7 +23415,7 @@
               <a:buNone/>
             </a:pPr>
             <a:r>
-              <a:rPr lang="en" sz="1800" b="1">
+              <a:rPr lang="en" sz="1800" b="1" dirty="0">
                 <a:solidFill>
                   <a:srgbClr val="FF6867"/>
                 </a:solidFill>
@@ -23376,7 +23427,7 @@
               <a:t>5:</a:t>
             </a:r>
             <a:r>
-              <a:rPr lang="en" sz="1800">
+              <a:rPr lang="en" sz="1800" dirty="0">
                 <a:solidFill>
                   <a:srgbClr val="012D3D"/>
                 </a:solidFill>
@@ -23388,22 +23439,38 @@
               <a:t> </a:t>
             </a:r>
             <a:r>
-              <a:rPr lang="en" sz="1800">
+              <a:rPr lang="en" sz="1800" dirty="0">
                 <a:solidFill>
                   <a:schemeClr val="lt1"/>
                 </a:solidFill>
               </a:rPr>
-              <a:t>Due Week 13 - LighthouseBnB due</a:t>
+              <a:t>Due Week 13 - </a:t>
+            </a:r>
+            <a:r>
+              <a:rPr lang="en" sz="1800" dirty="0" err="1">
+                <a:solidFill>
+                  <a:schemeClr val="lt1"/>
+                </a:solidFill>
+              </a:rPr>
+              <a:t>LighthouseBnB</a:t>
+            </a:r>
+            <a:r>
+              <a:rPr lang="en" sz="1800" dirty="0">
+                <a:solidFill>
+                  <a:schemeClr val="lt1"/>
+                </a:solidFill>
+              </a:rPr>
+              <a:t> due</a:t>
             </a:r>
             <a:br>
-              <a:rPr lang="en" sz="1800">
+              <a:rPr lang="en" sz="1800" dirty="0">
                 <a:solidFill>
                   <a:schemeClr val="lt1"/>
                 </a:solidFill>
               </a:rPr>
             </a:br>
             <a:r>
-              <a:rPr lang="en" sz="1800" b="1">
+              <a:rPr lang="en" sz="1800" b="1" dirty="0">
                 <a:solidFill>
                   <a:srgbClr val="FF6867"/>
                 </a:solidFill>
@@ -23415,7 +23482,7 @@
               <a:t>6:</a:t>
             </a:r>
             <a:r>
-              <a:rPr lang="en" sz="1800">
+              <a:rPr lang="en" sz="1800" dirty="0">
                 <a:solidFill>
                   <a:srgbClr val="012D3D"/>
                 </a:solidFill>
@@ -23427,14 +23494,14 @@
               <a:t> </a:t>
             </a:r>
             <a:r>
-              <a:rPr lang="en" sz="1800">
+              <a:rPr lang="en" sz="1800" dirty="0">
                 <a:solidFill>
                   <a:schemeClr val="lt1"/>
                 </a:solidFill>
               </a:rPr>
               <a:t>Due Week 19 - Scheduler due</a:t>
             </a:r>
-            <a:endParaRPr sz="1800">
+            <a:endParaRPr sz="1800" dirty="0">
               <a:solidFill>
                 <a:schemeClr val="lt1"/>
               </a:solidFill>
@@ -23458,7 +23525,7 @@
               <a:buFont typeface="Arial"/>
               <a:buNone/>
             </a:pPr>
-            <a:endParaRPr sz="1800">
+            <a:endParaRPr sz="1800" dirty="0">
               <a:solidFill>
                 <a:schemeClr val="lt1"/>
               </a:solidFill>
@@ -23478,7 +23545,7 @@
               <a:buSzPts val="3000"/>
               <a:buNone/>
             </a:pPr>
-            <a:endParaRPr sz="1150">
+            <a:endParaRPr sz="1150" dirty="0">
               <a:solidFill>
                 <a:srgbClr val="D1D2D3"/>
               </a:solidFill>
@@ -23505,7 +23572,7 @@
               <a:buSzPts val="3000"/>
               <a:buNone/>
             </a:pPr>
-            <a:endParaRPr sz="2600">
+            <a:endParaRPr sz="2600" dirty="0">
               <a:solidFill>
                 <a:schemeClr val="lt1"/>
               </a:solidFill>
@@ -23525,7 +23592,7 @@
               <a:buSzPts val="3000"/>
               <a:buNone/>
             </a:pPr>
-            <a:endParaRPr sz="2600">
+            <a:endParaRPr sz="2600" dirty="0">
               <a:solidFill>
                 <a:schemeClr val="lt1"/>
               </a:solidFill>
@@ -23545,7 +23612,7 @@
               <a:buSzPts val="3000"/>
               <a:buNone/>
             </a:pPr>
-            <a:endParaRPr sz="2600">
+            <a:endParaRPr sz="2600" dirty="0">
               <a:solidFill>
                 <a:srgbClr val="FFFFFF"/>
               </a:solidFill>
@@ -25193,7 +25260,7 @@
               <a:buNone/>
             </a:pPr>
             <a:r>
-              <a:rPr lang="en" sz="4800" b="1" i="0" u="none" strike="noStrike" cap="none">
+              <a:rPr lang="en" sz="4800" b="1" i="0" u="none" strike="noStrike" cap="none" dirty="0">
                 <a:solidFill>
                   <a:srgbClr val="FFFFFF"/>
                 </a:solidFill>
@@ -25205,7 +25272,7 @@
               <a:t>YOUR BIGGEST ENEMY?</a:t>
             </a:r>
             <a:br>
-              <a:rPr lang="en" sz="4800" b="1" i="0" u="sng" strike="noStrike" cap="none">
+              <a:rPr lang="en" sz="4800" b="1" i="0" u="sng" strike="noStrike" cap="none" dirty="0">
                 <a:solidFill>
                   <a:srgbClr val="FFFFFF"/>
                 </a:solidFill>
@@ -25216,7 +25283,7 @@
               </a:rPr>
             </a:br>
             <a:r>
-              <a:rPr lang="en" sz="3300" b="1" i="0" u="none" strike="noStrike" cap="none">
+              <a:rPr lang="en" sz="3300" b="1" i="0" u="none" strike="noStrike" cap="none" dirty="0">
                 <a:solidFill>
                   <a:srgbClr val="012D3D"/>
                 </a:solidFill>
@@ -25227,7 +25294,7 @@
               </a:rPr>
               <a:t>Don’t freeze in the face of a problem. Break it into small pieces… write pseudo-code… and try something!</a:t>
             </a:r>
-            <a:endParaRPr sz="3300" b="1" i="0" u="none" strike="noStrike" cap="none">
+            <a:endParaRPr sz="3300" b="1" i="0" u="none" strike="noStrike" cap="none" dirty="0">
               <a:solidFill>
                 <a:srgbClr val="012D3D"/>
               </a:solidFill>
@@ -25255,7 +25322,7 @@
               <a:buFont typeface="Arial"/>
               <a:buNone/>
             </a:pPr>
-            <a:endParaRPr sz="3300" b="1" i="0" u="none" strike="noStrike" cap="none">
+            <a:endParaRPr sz="3300" b="1" i="0" u="none" strike="noStrike" cap="none" dirty="0">
               <a:solidFill>
                 <a:srgbClr val="012D3D"/>
               </a:solidFill>
@@ -25284,7 +25351,7 @@
               <a:buNone/>
             </a:pPr>
             <a:r>
-              <a:rPr lang="en" sz="2000" b="1" i="1" u="none" strike="noStrike" cap="none">
+              <a:rPr lang="en" sz="2000" b="1" i="1" u="none" strike="noStrike" cap="none" dirty="0">
                 <a:solidFill>
                   <a:srgbClr val="012D3D"/>
                 </a:solidFill>
@@ -25295,7 +25362,7 @@
               </a:rPr>
               <a:t>Look at previous examples from class, or from your own experiments. There are often pieces you can carry to new challenges!</a:t>
             </a:r>
-            <a:endParaRPr sz="2000" b="1" i="1" u="sng" strike="noStrike" cap="none">
+            <a:endParaRPr sz="2000" b="1" i="1" u="sng" strike="noStrike" cap="none" dirty="0">
               <a:solidFill>
                 <a:srgbClr val="012D3D"/>
               </a:solidFill>
@@ -29694,7 +29761,7 @@
               <a:buNone/>
             </a:pPr>
             <a:r>
-              <a:rPr lang="en" sz="4800" b="1" i="0" u="none" strike="noStrike" cap="none">
+              <a:rPr lang="en" sz="4800" b="1" i="0" u="none" strike="noStrike" cap="none" dirty="0">
                 <a:solidFill>
                   <a:srgbClr val="DA5251"/>
                 </a:solidFill>
@@ -29705,7 +29772,7 @@
               </a:rPr>
               <a:t>MODULE 1 (Weeks 1 - 4) </a:t>
             </a:r>
-            <a:endParaRPr sz="4800" b="1" i="0" u="none" strike="noStrike" cap="none">
+            <a:endParaRPr sz="4800" b="1" i="0" u="none" strike="noStrike" cap="none" dirty="0">
               <a:solidFill>
                 <a:srgbClr val="DA5251"/>
               </a:solidFill>
@@ -29734,7 +29801,7 @@
               <a:buNone/>
             </a:pPr>
             <a:r>
-              <a:rPr lang="en" sz="4800" b="1" i="0" u="none" strike="noStrike" cap="none">
+              <a:rPr lang="en" sz="4800" b="1" i="0" u="none" strike="noStrike" cap="none" dirty="0">
                 <a:solidFill>
                   <a:srgbClr val="DA5251"/>
                 </a:solidFill>
@@ -29746,7 +29813,7 @@
               <a:t> </a:t>
             </a:r>
             <a:r>
-              <a:rPr lang="en" sz="4500" b="1" i="0" u="none" strike="noStrike" cap="none">
+              <a:rPr lang="en" sz="4500" b="1" i="0" u="none" strike="noStrike" cap="none" dirty="0">
                 <a:solidFill>
                   <a:srgbClr val="DA5251"/>
                 </a:solidFill>
@@ -29757,7 +29824,7 @@
               </a:rPr>
               <a:t>Programming Fundamentals</a:t>
             </a:r>
-            <a:endParaRPr sz="4500" b="1" i="0" u="none" strike="noStrike" cap="none">
+            <a:endParaRPr sz="4500" b="1" i="0" u="none" strike="noStrike" cap="none" dirty="0">
               <a:solidFill>
                 <a:srgbClr val="DA5251"/>
               </a:solidFill>
@@ -29786,7 +29853,7 @@
               <a:buNone/>
             </a:pPr>
             <a:r>
-              <a:rPr lang="en" sz="4500" b="1" i="0" u="none" strike="noStrike" cap="none">
+              <a:rPr lang="en" sz="4500" b="1" i="0" u="none" strike="noStrike" cap="none" dirty="0">
                 <a:solidFill>
                   <a:srgbClr val="DA5251"/>
                 </a:solidFill>
@@ -29795,9 +29862,33 @@
                 <a:cs typeface="Proxima Nova"/>
                 <a:sym typeface="Proxima Nova"/>
               </a:rPr>
-              <a:t>with Javascript </a:t>
-            </a:r>
-            <a:endParaRPr sz="4500" b="1" i="0" u="none" strike="noStrike" cap="none">
+              <a:t>with </a:t>
+            </a:r>
+            <a:r>
+              <a:rPr lang="en" sz="4500" b="1" i="0" u="none" strike="noStrike" cap="none" dirty="0" err="1">
+                <a:solidFill>
+                  <a:srgbClr val="DA5251"/>
+                </a:solidFill>
+                <a:latin typeface="Proxima Nova"/>
+                <a:ea typeface="Proxima Nova"/>
+                <a:cs typeface="Proxima Nova"/>
+                <a:sym typeface="Proxima Nova"/>
+              </a:rPr>
+              <a:t>Javascript</a:t>
+            </a:r>
+            <a:r>
+              <a:rPr lang="en" sz="4500" b="1" i="0" u="none" strike="noStrike" cap="none" dirty="0">
+                <a:solidFill>
+                  <a:srgbClr val="DA5251"/>
+                </a:solidFill>
+                <a:latin typeface="Proxima Nova"/>
+                <a:ea typeface="Proxima Nova"/>
+                <a:cs typeface="Proxima Nova"/>
+                <a:sym typeface="Proxima Nova"/>
+              </a:rPr>
+              <a:t> </a:t>
+            </a:r>
+            <a:endParaRPr sz="4500" b="1" i="0" u="none" strike="noStrike" cap="none" dirty="0">
               <a:solidFill>
                 <a:srgbClr val="DA5251"/>
               </a:solidFill>
@@ -29825,7 +29916,7 @@
               <a:buFont typeface="Arial"/>
               <a:buNone/>
             </a:pPr>
-            <a:endParaRPr sz="1800" b="1" i="0" u="none" strike="noStrike" cap="none">
+            <a:endParaRPr sz="1800" b="1" i="0" u="none" strike="noStrike" cap="none" dirty="0">
               <a:solidFill>
                 <a:schemeClr val="lt1"/>
               </a:solidFill>
@@ -29854,7 +29945,7 @@
               <a:buNone/>
             </a:pPr>
             <a:r>
-              <a:rPr lang="en" sz="1800" b="1" i="0" u="none" strike="noStrike" cap="none">
+              <a:rPr lang="en" sz="1800" b="1" i="0" u="none" strike="noStrike" cap="none" dirty="0">
                 <a:solidFill>
                   <a:schemeClr val="lt1"/>
                 </a:solidFill>
@@ -29866,7 +29957,7 @@
               <a:t>FOCAL:</a:t>
             </a:r>
             <a:r>
-              <a:rPr lang="en" sz="1800" b="0" i="0" u="none" strike="noStrike" cap="none">
+              <a:rPr lang="en" sz="1800" b="0" i="0" u="none" strike="noStrike" cap="none" dirty="0">
                 <a:solidFill>
                   <a:schemeClr val="lt1"/>
                 </a:solidFill>
@@ -29877,7 +29968,7 @@
               </a:rPr>
               <a:t> Functions, Objects, Conditionals, Arrays, Loops.</a:t>
             </a:r>
-            <a:endParaRPr sz="1800" b="0" i="0" u="none" strike="noStrike" cap="none">
+            <a:endParaRPr sz="1800" b="0" i="0" u="none" strike="noStrike" cap="none" dirty="0">
               <a:solidFill>
                 <a:schemeClr val="lt1"/>
               </a:solidFill>
@@ -29906,7 +29997,7 @@
               <a:buNone/>
             </a:pPr>
             <a:r>
-              <a:rPr lang="en" sz="1800" b="0" i="0" u="none" strike="noStrike" cap="none">
+              <a:rPr lang="en" sz="1800" b="0" i="0" u="none" strike="noStrike" cap="none" dirty="0">
                 <a:solidFill>
                   <a:schemeClr val="lt1"/>
                 </a:solidFill>
@@ -29917,7 +30008,7 @@
               </a:rPr>
               <a:t>Dev Approach: Code Style &amp; Quality, Testing, Debugging, Problem Solving</a:t>
             </a:r>
-            <a:endParaRPr sz="1800" b="0" i="0" u="none" strike="noStrike" cap="none">
+            <a:endParaRPr sz="1800" b="0" i="0" u="none" strike="noStrike" cap="none" dirty="0">
               <a:solidFill>
                 <a:schemeClr val="lt1"/>
               </a:solidFill>
@@ -29946,7 +30037,7 @@
               <a:buNone/>
             </a:pPr>
             <a:br>
-              <a:rPr lang="en" sz="1800" b="0" i="0" u="none" strike="noStrike" cap="none">
+              <a:rPr lang="en" sz="1800" b="0" i="0" u="none" strike="noStrike" cap="none" dirty="0">
                 <a:solidFill>
                   <a:schemeClr val="lt1"/>
                 </a:solidFill>
@@ -29956,7 +30047,7 @@
                 <a:sym typeface="Proxima Nova"/>
               </a:rPr>
             </a:br>
-            <a:endParaRPr sz="1800" b="0" i="0" u="none" strike="noStrike" cap="none">
+            <a:endParaRPr sz="1800" b="0" i="0" u="none" strike="noStrike" cap="none" dirty="0">
               <a:solidFill>
                 <a:schemeClr val="lt1"/>
               </a:solidFill>
@@ -29984,7 +30075,7 @@
               <a:buFont typeface="Arial"/>
               <a:buNone/>
             </a:pPr>
-            <a:endParaRPr sz="4800" b="1" i="0" u="none" strike="noStrike" cap="none">
+            <a:endParaRPr sz="4800" b="1" i="0" u="none" strike="noStrike" cap="none" dirty="0">
               <a:solidFill>
                 <a:srgbClr val="DA5251"/>
               </a:solidFill>

</xml_diff>